<commit_message>
MOD: Se actualiza agenda curso técnicas de programacion
</commit_message>
<xml_diff>
--- a/material/Tecnicas/ClasesTutoriales/17. Archivos.pptx
+++ b/material/Tecnicas/ClasesTutoriales/17. Archivos.pptx
@@ -28453,7 +28453,7 @@
             <a:fld id="{72F64849-FDB5-4298-A413-9D70FF7B4EB1}" type="datetimeFigureOut">
               <a:rPr lang="es-CO" smtClean="0"/>
               <a:pPr/>
-              <a:t>19/04/2020</a:t>
+              <a:t>21/04/2020</a:t>
             </a:fld>
             <a:endParaRPr lang="es-CO"/>
           </a:p>
@@ -29727,7 +29727,7 @@
             <a:fld id="{DCEF22F2-EA04-4B03-8A20-CFDE6BC87E1C}" type="datetimeFigureOut">
               <a:rPr lang="es-CO" smtClean="0"/>
               <a:pPr/>
-              <a:t>19/04/2020</a:t>
+              <a:t>21/04/2020</a:t>
             </a:fld>
             <a:endParaRPr lang="es-CO"/>
           </a:p>
@@ -29904,7 +29904,7 @@
             <a:fld id="{DCEF22F2-EA04-4B03-8A20-CFDE6BC87E1C}" type="datetimeFigureOut">
               <a:rPr lang="es-CO" smtClean="0"/>
               <a:pPr/>
-              <a:t>19/04/2020</a:t>
+              <a:t>21/04/2020</a:t>
             </a:fld>
             <a:endParaRPr lang="es-CO"/>
           </a:p>
@@ -30107,7 +30107,7 @@
             <a:fld id="{DCEF22F2-EA04-4B03-8A20-CFDE6BC87E1C}" type="datetimeFigureOut">
               <a:rPr lang="es-CO" smtClean="0"/>
               <a:pPr/>
-              <a:t>19/04/2020</a:t>
+              <a:t>21/04/2020</a:t>
             </a:fld>
             <a:endParaRPr lang="es-CO"/>
           </a:p>
@@ -30463,7 +30463,7 @@
             <a:fld id="{DCEF22F2-EA04-4B03-8A20-CFDE6BC87E1C}" type="datetimeFigureOut">
               <a:rPr lang="es-CO" smtClean="0"/>
               <a:pPr/>
-              <a:t>19/04/2020</a:t>
+              <a:t>21/04/2020</a:t>
             </a:fld>
             <a:endParaRPr lang="es-CO"/>
           </a:p>
@@ -30748,7 +30748,7 @@
             <a:fld id="{DCEF22F2-EA04-4B03-8A20-CFDE6BC87E1C}" type="datetimeFigureOut">
               <a:rPr lang="es-CO" smtClean="0"/>
               <a:pPr/>
-              <a:t>19/04/2020</a:t>
+              <a:t>21/04/2020</a:t>
             </a:fld>
             <a:endParaRPr lang="es-CO"/>
           </a:p>
@@ -31167,7 +31167,7 @@
             <a:fld id="{DCEF22F2-EA04-4B03-8A20-CFDE6BC87E1C}" type="datetimeFigureOut">
               <a:rPr lang="es-CO" smtClean="0"/>
               <a:pPr/>
-              <a:t>19/04/2020</a:t>
+              <a:t>21/04/2020</a:t>
             </a:fld>
             <a:endParaRPr lang="es-CO"/>
           </a:p>
@@ -31282,7 +31282,7 @@
             <a:fld id="{DCEF22F2-EA04-4B03-8A20-CFDE6BC87E1C}" type="datetimeFigureOut">
               <a:rPr lang="es-CO" smtClean="0"/>
               <a:pPr/>
-              <a:t>19/04/2020</a:t>
+              <a:t>21/04/2020</a:t>
             </a:fld>
             <a:endParaRPr lang="es-CO"/>
           </a:p>
@@ -31374,7 +31374,7 @@
             <a:fld id="{DCEF22F2-EA04-4B03-8A20-CFDE6BC87E1C}" type="datetimeFigureOut">
               <a:rPr lang="es-CO" smtClean="0"/>
               <a:pPr/>
-              <a:t>19/04/2020</a:t>
+              <a:t>21/04/2020</a:t>
             </a:fld>
             <a:endParaRPr lang="es-CO"/>
           </a:p>
@@ -31648,7 +31648,7 @@
             <a:fld id="{DCEF22F2-EA04-4B03-8A20-CFDE6BC87E1C}" type="datetimeFigureOut">
               <a:rPr lang="es-CO" smtClean="0"/>
               <a:pPr/>
-              <a:t>19/04/2020</a:t>
+              <a:t>21/04/2020</a:t>
             </a:fld>
             <a:endParaRPr lang="es-CO"/>
           </a:p>
@@ -31902,7 +31902,7 @@
             <a:fld id="{DCEF22F2-EA04-4B03-8A20-CFDE6BC87E1C}" type="datetimeFigureOut">
               <a:rPr lang="es-CO" smtClean="0"/>
               <a:pPr/>
-              <a:t>19/04/2020</a:t>
+              <a:t>21/04/2020</a:t>
             </a:fld>
             <a:endParaRPr lang="es-CO"/>
           </a:p>
@@ -32112,7 +32112,7 @@
             <a:fld id="{DCEF22F2-EA04-4B03-8A20-CFDE6BC87E1C}" type="datetimeFigureOut">
               <a:rPr lang="es-CO" smtClean="0"/>
               <a:pPr/>
-              <a:t>19/04/2020</a:t>
+              <a:t>21/04/2020</a:t>
             </a:fld>
             <a:endParaRPr lang="es-CO"/>
           </a:p>
@@ -34364,34 +34364,32 @@
       </p:sp>
       <p:pic>
         <p:nvPicPr>
-          <p:cNvPr id="40962" name="Picture 2"/>
+          <p:cNvPr id="3" name="Picture 2">
+            <a:extLst>
+              <a:ext uri="{FF2B5EF4-FFF2-40B4-BE49-F238E27FC236}">
+                <a16:creationId xmlns:a16="http://schemas.microsoft.com/office/drawing/2014/main" id="{B9BE32E0-3A59-4517-869C-6A9087DF682F}"/>
+              </a:ext>
+            </a:extLst>
+          </p:cNvPr>
           <p:cNvPicPr>
-            <a:picLocks noChangeAspect="1" noChangeArrowheads="1"/>
+            <a:picLocks noChangeAspect="1"/>
           </p:cNvPicPr>
           <p:nvPr/>
         </p:nvPicPr>
         <p:blipFill>
-          <a:blip r:embed="rId2" cstate="print"/>
-          <a:srcRect/>
+          <a:blip r:embed="rId2"/>
           <a:stretch>
             <a:fillRect/>
           </a:stretch>
         </p:blipFill>
-        <p:spPr bwMode="auto">
+        <p:spPr>
           <a:xfrm>
-            <a:off x="539552" y="980728"/>
-            <a:ext cx="8280920" cy="5507654"/>
+            <a:off x="144372" y="1268760"/>
+            <a:ext cx="8855256" cy="3888432"/>
           </a:xfrm>
           <a:prstGeom prst="rect">
             <a:avLst/>
           </a:prstGeom>
-          <a:noFill/>
-          <a:ln w="9525">
-            <a:noFill/>
-            <a:miter lim="800000"/>
-            <a:headEnd/>
-            <a:tailEnd/>
-          </a:ln>
         </p:spPr>
       </p:pic>
     </p:spTree>

</xml_diff>